<commit_message>
updated ch 8 slides
</commit_message>
<xml_diff>
--- a/docs/slides/nnintro-ch8-dist.pptx
+++ b/docs/slides/nnintro-ch8-dist.pptx
@@ -5,10 +5,10 @@
     <p:sldMasterId id="2147483648" r:id="rId1"/>
   </p:sldMasterIdLst>
   <p:notesMasterIdLst>
-    <p:notesMasterId r:id="rId40"/>
+    <p:notesMasterId r:id="rId41"/>
   </p:notesMasterIdLst>
   <p:handoutMasterIdLst>
-    <p:handoutMasterId r:id="rId41"/>
+    <p:handoutMasterId r:id="rId42"/>
   </p:handoutMasterIdLst>
   <p:sldIdLst>
     <p:sldId id="256" r:id="rId2"/>
@@ -38,17 +38,18 @@
     <p:sldId id="1104" r:id="rId26"/>
     <p:sldId id="279" r:id="rId27"/>
     <p:sldId id="293" r:id="rId28"/>
-    <p:sldId id="282" r:id="rId29"/>
-    <p:sldId id="294" r:id="rId30"/>
-    <p:sldId id="295" r:id="rId31"/>
-    <p:sldId id="283" r:id="rId32"/>
-    <p:sldId id="296" r:id="rId33"/>
-    <p:sldId id="285" r:id="rId34"/>
-    <p:sldId id="286" r:id="rId35"/>
-    <p:sldId id="287" r:id="rId36"/>
-    <p:sldId id="297" r:id="rId37"/>
-    <p:sldId id="298" r:id="rId38"/>
-    <p:sldId id="280" r:id="rId39"/>
+    <p:sldId id="1106" r:id="rId29"/>
+    <p:sldId id="282" r:id="rId30"/>
+    <p:sldId id="294" r:id="rId31"/>
+    <p:sldId id="295" r:id="rId32"/>
+    <p:sldId id="283" r:id="rId33"/>
+    <p:sldId id="296" r:id="rId34"/>
+    <p:sldId id="285" r:id="rId35"/>
+    <p:sldId id="286" r:id="rId36"/>
+    <p:sldId id="287" r:id="rId37"/>
+    <p:sldId id="297" r:id="rId38"/>
+    <p:sldId id="298" r:id="rId39"/>
+    <p:sldId id="280" r:id="rId40"/>
   </p:sldIdLst>
   <p:sldSz cx="9144000" cy="6858000" type="screen4x3"/>
   <p:notesSz cx="6858000" cy="9144000"/>
@@ -262,7 +263,7 @@
           <a:p>
             <a:fld id="{B01994EC-483D-324E-A14B-FCB2363A6145}" type="datetimeFigureOut">
               <a:rPr lang="en-US" smtClean="0"/>
-              <a:t>10/29/24</a:t>
+              <a:t>10/21/25</a:t>
             </a:fld>
             <a:endParaRPr lang="en-US"/>
           </a:p>
@@ -428,7 +429,7 @@
           <a:p>
             <a:fld id="{14CAC850-72E3-3F4D-B35F-F73F8A3CE0A9}" type="datetimeFigureOut">
               <a:rPr lang="en-US" smtClean="0"/>
-              <a:t>10/29/24</a:t>
+              <a:t>10/21/25</a:t>
             </a:fld>
             <a:endParaRPr lang="en-US"/>
           </a:p>
@@ -1046,7 +1047,7 @@
           <a:p>
             <a:fld id="{0B7FF8D0-70A2-2644-AB9A-71B243683867}" type="datetime1">
               <a:rPr lang="en-US" smtClean="0"/>
-              <a:t>10/29/24</a:t>
+              <a:t>10/21/25</a:t>
             </a:fld>
             <a:endParaRPr lang="en-US"/>
           </a:p>
@@ -1249,7 +1250,7 @@
           <a:p>
             <a:fld id="{103ADB3E-F530-B04E-9C00-73A665A746DF}" type="datetime1">
               <a:rPr lang="en-US" smtClean="0"/>
-              <a:t>10/29/24</a:t>
+              <a:t>10/21/25</a:t>
             </a:fld>
             <a:endParaRPr lang="en-US"/>
           </a:p>
@@ -1462,7 +1463,7 @@
           <a:p>
             <a:fld id="{29AA8647-DDC8-8045-929B-87F8A0123AAC}" type="datetime1">
               <a:rPr lang="en-US" smtClean="0"/>
-              <a:t>10/29/24</a:t>
+              <a:t>10/21/25</a:t>
             </a:fld>
             <a:endParaRPr lang="en-US"/>
           </a:p>
@@ -1972,7 +1973,7 @@
           <a:p>
             <a:fld id="{0E798730-4C36-8843-9EA4-9C3064893DBD}" type="datetime1">
               <a:rPr lang="en-US" smtClean="0"/>
-              <a:t>10/29/24</a:t>
+              <a:t>10/21/25</a:t>
             </a:fld>
             <a:endParaRPr lang="en-US"/>
           </a:p>
@@ -2252,7 +2253,7 @@
           <a:p>
             <a:fld id="{1D207688-05DA-4D47-AA55-61A105CE9D81}" type="datetime1">
               <a:rPr lang="en-US" smtClean="0"/>
-              <a:t>10/29/24</a:t>
+              <a:t>10/21/25</a:t>
             </a:fld>
             <a:endParaRPr lang="en-US"/>
           </a:p>
@@ -2537,7 +2538,7 @@
           <a:p>
             <a:fld id="{F3AF4D28-8309-FE49-AB2C-BE2DC70C9A1C}" type="datetime1">
               <a:rPr lang="en-US" smtClean="0"/>
-              <a:t>10/29/24</a:t>
+              <a:t>10/21/25</a:t>
             </a:fld>
             <a:endParaRPr lang="en-US"/>
           </a:p>
@@ -2991,7 +2992,7 @@
           <a:p>
             <a:fld id="{93C85934-7B0D-E641-970A-4611A6D96867}" type="datetime1">
               <a:rPr lang="en-US" smtClean="0"/>
-              <a:t>10/29/24</a:t>
+              <a:t>10/21/25</a:t>
             </a:fld>
             <a:endParaRPr lang="en-US"/>
           </a:p>
@@ -3148,7 +3149,7 @@
           <a:p>
             <a:fld id="{9E954B22-D73B-5641-AE5B-A44D888704A2}" type="datetime1">
               <a:rPr lang="en-US" smtClean="0"/>
-              <a:t>10/29/24</a:t>
+              <a:t>10/21/25</a:t>
             </a:fld>
             <a:endParaRPr lang="en-US"/>
           </a:p>
@@ -3278,7 +3279,7 @@
           <a:p>
             <a:fld id="{FAF56C4A-8140-4243-9F4B-6A0F328069B3}" type="datetime1">
               <a:rPr lang="en-US" smtClean="0"/>
-              <a:t>10/29/24</a:t>
+              <a:t>10/21/25</a:t>
             </a:fld>
             <a:endParaRPr lang="en-US"/>
           </a:p>
@@ -3553,7 +3554,7 @@
           <a:p>
             <a:fld id="{0AB7471A-7A79-1F42-B8F4-4C366A4D2860}" type="datetime1">
               <a:rPr lang="en-US" smtClean="0"/>
-              <a:t>10/29/24</a:t>
+              <a:t>10/21/25</a:t>
             </a:fld>
             <a:endParaRPr lang="en-US"/>
           </a:p>
@@ -3805,7 +3806,7 @@
           <a:p>
             <a:fld id="{8F7C599A-C565-AA4F-B0B7-B1C9F3E19B32}" type="datetime1">
               <a:rPr lang="en-US" smtClean="0"/>
-              <a:t>10/29/24</a:t>
+              <a:t>10/21/25</a:t>
             </a:fld>
             <a:endParaRPr lang="en-US"/>
           </a:p>
@@ -4016,7 +4017,7 @@
           <a:p>
             <a:fld id="{07193804-F157-E84E-A058-6F1D58E71D89}" type="datetime1">
               <a:rPr lang="en-US" smtClean="0"/>
-              <a:t>10/29/24</a:t>
+              <a:t>10/21/25</a:t>
             </a:fld>
             <a:endParaRPr lang="en-US"/>
           </a:p>
@@ -12845,167 +12846,228 @@
       </p:grpSpPr>
       <p:sp>
         <p:nvSpPr>
-          <p:cNvPr id="4" name="Slide Number Placeholder 3">
-            <a:extLst>
-              <a:ext uri="{FF2B5EF4-FFF2-40B4-BE49-F238E27FC236}">
-                <a16:creationId xmlns:a16="http://schemas.microsoft.com/office/drawing/2014/main" id="{B31ABCEF-0199-DE4F-9913-7FC3E729CB1F}"/>
-              </a:ext>
-            </a:extLst>
-          </p:cNvPr>
-          <p:cNvSpPr>
-            <a:spLocks noGrp="1"/>
-          </p:cNvSpPr>
-          <p:nvPr>
-            <p:ph type="sldNum" sz="quarter" idx="12"/>
-          </p:nvPr>
-        </p:nvSpPr>
-        <p:spPr/>
-        <p:txBody>
-          <a:bodyPr/>
-          <a:lstStyle/>
-          <a:p>
-            <a:fld id="{FF5157AA-4A4D-2C48-B0F6-C526C028AE97}" type="slidenum">
-              <a:rPr lang="en-US" smtClean="0"/>
-              <a:t>28</a:t>
-            </a:fld>
-            <a:endParaRPr lang="en-US"/>
+          <p:cNvPr id="2" name="Title 1">
+            <a:extLst>
+              <a:ext uri="{FF2B5EF4-FFF2-40B4-BE49-F238E27FC236}">
+                <a16:creationId xmlns:a16="http://schemas.microsoft.com/office/drawing/2014/main" id="{3BB2BD44-3C42-5285-FF26-92B8DEF531C5}"/>
+              </a:ext>
+            </a:extLst>
+          </p:cNvPr>
+          <p:cNvSpPr>
+            <a:spLocks noGrp="1"/>
+          </p:cNvSpPr>
+          <p:nvPr>
+            <p:ph type="title"/>
+          </p:nvPr>
+        </p:nvSpPr>
+        <p:spPr>
+          <a:xfrm>
+            <a:off x="457200" y="274638"/>
+            <a:ext cx="8229600" cy="1143000"/>
+          </a:xfrm>
+        </p:spPr>
+        <p:txBody>
+          <a:bodyPr anchor="ctr">
+            <a:normAutofit/>
+          </a:bodyPr>
+          <a:lstStyle/>
+          <a:p>
+            <a:r>
+              <a:rPr lang="en-US" dirty="0"/>
+              <a:t>Historical context</a:t>
+            </a:r>
           </a:p>
         </p:txBody>
       </p:sp>
       <p:pic>
         <p:nvPicPr>
-          <p:cNvPr id="6" name="Picture 5">
-            <a:extLst>
-              <a:ext uri="{FF2B5EF4-FFF2-40B4-BE49-F238E27FC236}">
-                <a16:creationId xmlns:a16="http://schemas.microsoft.com/office/drawing/2014/main" id="{9060D93E-C98B-B042-A783-CB00914F43F2}"/>
+          <p:cNvPr id="1026" name="Picture 2" descr="When Yoda says there is another ...">
+            <a:extLst>
+              <a:ext uri="{FF2B5EF4-FFF2-40B4-BE49-F238E27FC236}">
+                <a16:creationId xmlns:a16="http://schemas.microsoft.com/office/drawing/2014/main" id="{0BF760D3-9A46-5C2E-720C-18A66A62B6AA}"/>
               </a:ext>
             </a:extLst>
           </p:cNvPr>
           <p:cNvPicPr>
-            <a:picLocks noChangeAspect="1"/>
+            <a:picLocks noChangeAspect="1" noChangeArrowheads="1"/>
           </p:cNvPicPr>
           <p:nvPr/>
         </p:nvPicPr>
         <p:blipFill>
-          <a:blip r:embed="rId2"/>
+          <a:blip r:embed="rId2">
+            <a:extLst>
+              <a:ext uri="{28A0092B-C50C-407E-A947-70E740481C1C}">
+                <a14:useLocalDpi xmlns:a14="http://schemas.microsoft.com/office/drawing/2010/main" val="0"/>
+              </a:ext>
+            </a:extLst>
+          </a:blip>
           <a:stretch>
             <a:fillRect/>
           </a:stretch>
         </p:blipFill>
-        <p:spPr>
+        <p:spPr bwMode="auto">
           <a:xfrm>
-            <a:off x="1742745" y="744071"/>
-            <a:ext cx="4667019" cy="4117016"/>
+            <a:off x="457200" y="2732373"/>
+            <a:ext cx="4038600" cy="2261616"/>
           </a:xfrm>
           <a:prstGeom prst="rect">
             <a:avLst/>
           </a:prstGeom>
+          <a:solidFill>
+            <a:srgbClr val="FFFFFF"/>
+          </a:solidFill>
+          <a:extLst>
+            <a:ext uri="{909E8E84-426E-40DD-AFC4-6F175D3DCCD1}">
+              <a14:hiddenFill xmlns:a14="http://schemas.microsoft.com/office/drawing/2010/main">
+                <a:solidFill>
+                  <a:srgbClr val="FFFFFF"/>
+                </a:solidFill>
+              </a14:hiddenFill>
+            </a:ext>
+          </a:extLst>
         </p:spPr>
       </p:pic>
       <p:sp>
         <p:nvSpPr>
-          <p:cNvPr id="2" name="TextBox 1">
-            <a:extLst>
-              <a:ext uri="{FF2B5EF4-FFF2-40B4-BE49-F238E27FC236}">
-                <a16:creationId xmlns:a16="http://schemas.microsoft.com/office/drawing/2014/main" id="{38A108EA-5807-A441-8AA1-149016DF3251}"/>
-              </a:ext>
-            </a:extLst>
-          </p:cNvPr>
-          <p:cNvSpPr txBox="1"/>
-          <p:nvPr/>
+          <p:cNvPr id="3" name="Content Placeholder 2">
+            <a:extLst>
+              <a:ext uri="{FF2B5EF4-FFF2-40B4-BE49-F238E27FC236}">
+                <a16:creationId xmlns:a16="http://schemas.microsoft.com/office/drawing/2014/main" id="{137442DA-D90E-3DEC-ADBB-E9D951E49965}"/>
+              </a:ext>
+            </a:extLst>
+          </p:cNvPr>
+          <p:cNvSpPr>
+            <a:spLocks noGrp="1"/>
+          </p:cNvSpPr>
+          <p:nvPr>
+            <p:ph sz="half" idx="2"/>
+          </p:nvPr>
         </p:nvSpPr>
         <p:spPr>
           <a:xfrm>
-            <a:off x="887506" y="5285553"/>
-            <a:ext cx="7007368" cy="646331"/>
+            <a:off x="4648200" y="1600200"/>
+            <a:ext cx="4038600" cy="4525963"/>
           </a:xfrm>
-          <a:prstGeom prst="rect">
-            <a:avLst/>
-          </a:prstGeom>
-          <a:noFill/>
         </p:spPr>
         <p:txBody>
-          <a:bodyPr wrap="none" rtlCol="0">
-            <a:spAutoFit/>
+          <a:bodyPr>
+            <a:normAutofit/>
           </a:bodyPr>
           <a:lstStyle/>
           <a:p>
-            <a:pPr algn="ctr"/>
-            <a:r>
-              <a:rPr lang="en-US" dirty="0"/>
-              <a:t>“A bagel and cream cheese (also known as bagel with cream cheese) is a </a:t>
-            </a:r>
-          </a:p>
-          <a:p>
-            <a:pPr algn="ctr"/>
-            <a:r>
-              <a:rPr lang="en-US" dirty="0"/>
-              <a:t>common food pairing in American cuisine.”</a:t>
-            </a:r>
-          </a:p>
-        </p:txBody>
-      </p:sp>
-      <p:sp>
-        <p:nvSpPr>
-          <p:cNvPr id="3" name="TextBox 2">
-            <a:extLst>
-              <a:ext uri="{FF2B5EF4-FFF2-40B4-BE49-F238E27FC236}">
-                <a16:creationId xmlns:a16="http://schemas.microsoft.com/office/drawing/2014/main" id="{27B43A53-99B1-F943-B8CE-CE0FBC642659}"/>
-              </a:ext>
-            </a:extLst>
-          </p:cNvPr>
-          <p:cNvSpPr txBox="1"/>
-          <p:nvPr/>
+            <a:pPr>
+              <a:lnSpc>
+                <a:spcPct val="90000"/>
+              </a:lnSpc>
+            </a:pPr>
+            <a:r>
+              <a:rPr lang="en-US" sz="1800" dirty="0"/>
+              <a:t>The previous objective in word2vec is called “skip-gram”. Why?</a:t>
+            </a:r>
+          </a:p>
+          <a:p>
+            <a:pPr>
+              <a:lnSpc>
+                <a:spcPct val="90000"/>
+              </a:lnSpc>
+            </a:pPr>
+            <a:r>
+              <a:rPr lang="en-US" sz="1800" dirty="0"/>
+              <a:t>There is another </a:t>
+            </a:r>
+            <a:r>
+              <a:rPr lang="en-US" sz="1800" dirty="0">
+                <a:sym typeface="Wingdings" pitchFamily="2" charset="2"/>
+              </a:rPr>
+              <a:t> </a:t>
+            </a:r>
+            <a:endParaRPr lang="en-US" sz="1800" dirty="0"/>
+          </a:p>
+          <a:p>
+            <a:pPr lvl="1">
+              <a:lnSpc>
+                <a:spcPct val="90000"/>
+              </a:lnSpc>
+            </a:pPr>
+            <a:r>
+              <a:rPr lang="en-US" sz="1800" dirty="0"/>
+              <a:t>This objective matches the distribution hypothesis directly, i.e., predict the word given the context.</a:t>
+            </a:r>
+          </a:p>
+          <a:p>
+            <a:pPr lvl="1">
+              <a:lnSpc>
+                <a:spcPct val="90000"/>
+              </a:lnSpc>
+            </a:pPr>
+            <a:r>
+              <a:rPr lang="en-US" sz="1800" dirty="0"/>
+              <a:t>This objective was called “continuous bag of words.” Why?</a:t>
+            </a:r>
+          </a:p>
+          <a:p>
+            <a:pPr lvl="1">
+              <a:lnSpc>
+                <a:spcPct val="90000"/>
+              </a:lnSpc>
+            </a:pPr>
+            <a:r>
+              <a:rPr lang="en-US" sz="1800" dirty="0"/>
+              <a:t>In the original work, this objective was shown to perform worse than skip-gram. However, future work shown this to be caused by a bug in the original word2vec implementation…</a:t>
+            </a:r>
+          </a:p>
+        </p:txBody>
+      </p:sp>
+      <p:sp>
+        <p:nvSpPr>
+          <p:cNvPr id="4" name="Slide Number Placeholder 3">
+            <a:extLst>
+              <a:ext uri="{FF2B5EF4-FFF2-40B4-BE49-F238E27FC236}">
+                <a16:creationId xmlns:a16="http://schemas.microsoft.com/office/drawing/2014/main" id="{EA4FE175-F1C8-FE42-5325-B6F326BA5192}"/>
+              </a:ext>
+            </a:extLst>
+          </p:cNvPr>
+          <p:cNvSpPr>
+            <a:spLocks noGrp="1"/>
+          </p:cNvSpPr>
+          <p:nvPr>
+            <p:ph type="sldNum" sz="quarter" idx="12"/>
+          </p:nvPr>
         </p:nvSpPr>
         <p:spPr>
           <a:xfrm>
-            <a:off x="5592876" y="744071"/>
-            <a:ext cx="3093924" cy="646331"/>
+            <a:off x="6553200" y="6356350"/>
+            <a:ext cx="2133600" cy="365125"/>
           </a:xfrm>
-          <a:prstGeom prst="rect">
-            <a:avLst/>
-          </a:prstGeom>
-          <a:noFill/>
         </p:spPr>
         <p:txBody>
-          <a:bodyPr wrap="none" rtlCol="0">
-            <a:spAutoFit/>
+          <a:bodyPr anchor="ctr">
+            <a:normAutofit/>
           </a:bodyPr>
           <a:lstStyle/>
           <a:p>
-            <a:r>
-              <a:rPr lang="en-US" b="1" dirty="0">
-                <a:solidFill>
-                  <a:srgbClr val="0070C0"/>
-                </a:solidFill>
-              </a:rPr>
-              <a:t>Blue</a:t>
-            </a:r>
-            <a:r>
-              <a:rPr lang="en-US" dirty="0"/>
-              <a:t>: input (or center) vector</a:t>
-            </a:r>
-          </a:p>
-          <a:p>
-            <a:r>
-              <a:rPr lang="en-US" b="1" dirty="0">
-                <a:solidFill>
-                  <a:srgbClr val="FF0000"/>
-                </a:solidFill>
-              </a:rPr>
-              <a:t>Red</a:t>
-            </a:r>
-            <a:r>
-              <a:rPr lang="en-US" dirty="0"/>
-              <a:t>: output (or context) vector</a:t>
-            </a:r>
+            <a:pPr>
+              <a:spcAft>
+                <a:spcPts val="600"/>
+              </a:spcAft>
+            </a:pPr>
+            <a:fld id="{FF5157AA-4A4D-2C48-B0F6-C526C028AE97}" type="slidenum">
+              <a:rPr lang="en-US" smtClean="0"/>
+              <a:pPr>
+                <a:spcAft>
+                  <a:spcPts val="600"/>
+                </a:spcAft>
+              </a:pPr>
+              <a:t>28</a:t>
+            </a:fld>
+            <a:endParaRPr lang="en-US"/>
           </a:p>
         </p:txBody>
       </p:sp>
     </p:spTree>
     <p:extLst>
       <p:ext uri="{BB962C8B-B14F-4D97-AF65-F5344CB8AC3E}">
-        <p14:creationId xmlns:p14="http://schemas.microsoft.com/office/powerpoint/2010/main" val="3515326172"/>
+        <p14:creationId xmlns:p14="http://schemas.microsoft.com/office/powerpoint/2010/main" val="3693677897"/>
       </p:ext>
     </p:extLst>
   </p:cSld>
@@ -13034,80 +13096,10 @@
       </p:grpSpPr>
       <p:sp>
         <p:nvSpPr>
-          <p:cNvPr id="3" name="Title 2">
-            <a:extLst>
-              <a:ext uri="{FF2B5EF4-FFF2-40B4-BE49-F238E27FC236}">
-                <a16:creationId xmlns:a16="http://schemas.microsoft.com/office/drawing/2014/main" id="{346D13A3-9B8A-144A-A5CF-9623D22F4DE0}"/>
-              </a:ext>
-            </a:extLst>
-          </p:cNvPr>
-          <p:cNvSpPr>
-            <a:spLocks noGrp="1"/>
-          </p:cNvSpPr>
-          <p:nvPr>
-            <p:ph type="title"/>
-          </p:nvPr>
-        </p:nvSpPr>
-        <p:spPr/>
-        <p:txBody>
-          <a:bodyPr/>
-          <a:lstStyle/>
-          <a:p>
-            <a:r>
-              <a:rPr lang="en-US" dirty="0"/>
-              <a:t>Intuition: push/pull</a:t>
-            </a:r>
-          </a:p>
-        </p:txBody>
-      </p:sp>
-      <p:sp>
-        <p:nvSpPr>
-          <p:cNvPr id="4" name="Content Placeholder 3">
-            <a:extLst>
-              <a:ext uri="{FF2B5EF4-FFF2-40B4-BE49-F238E27FC236}">
-                <a16:creationId xmlns:a16="http://schemas.microsoft.com/office/drawing/2014/main" id="{1B82B699-97BF-7B4A-84CF-48420A5E5FCB}"/>
-              </a:ext>
-            </a:extLst>
-          </p:cNvPr>
-          <p:cNvSpPr>
-            <a:spLocks noGrp="1"/>
-          </p:cNvSpPr>
-          <p:nvPr>
-            <p:ph idx="1"/>
-          </p:nvPr>
-        </p:nvSpPr>
-        <p:spPr/>
-        <p:txBody>
-          <a:bodyPr/>
-          <a:lstStyle/>
-          <a:p>
-            <a:r>
-              <a:rPr lang="en-US" i="1" dirty="0"/>
-              <a:t>Pull</a:t>
-            </a:r>
-            <a:r>
-              <a:rPr lang="en-US" dirty="0"/>
-              <a:t> the red vectors for words in context closer to the blue vector for the center word</a:t>
-            </a:r>
-          </a:p>
-          <a:p>
-            <a:r>
-              <a:rPr lang="en-US" i="1" dirty="0"/>
-              <a:t>Push</a:t>
-            </a:r>
-            <a:r>
-              <a:rPr lang="en-US" dirty="0"/>
-              <a:t> the red vectors for words not in context away </a:t>
-            </a:r>
-          </a:p>
-        </p:txBody>
-      </p:sp>
-      <p:sp>
-        <p:nvSpPr>
-          <p:cNvPr id="2" name="Slide Number Placeholder 1">
-            <a:extLst>
-              <a:ext uri="{FF2B5EF4-FFF2-40B4-BE49-F238E27FC236}">
-                <a16:creationId xmlns:a16="http://schemas.microsoft.com/office/drawing/2014/main" id="{2CE16E76-060B-D342-98DF-25D4A685B420}"/>
+          <p:cNvPr id="4" name="Slide Number Placeholder 3">
+            <a:extLst>
+              <a:ext uri="{FF2B5EF4-FFF2-40B4-BE49-F238E27FC236}">
+                <a16:creationId xmlns:a16="http://schemas.microsoft.com/office/drawing/2014/main" id="{B31ABCEF-0199-DE4F-9913-7FC3E729CB1F}"/>
               </a:ext>
             </a:extLst>
           </p:cNvPr>
@@ -13131,10 +13123,140 @@
           </a:p>
         </p:txBody>
       </p:sp>
+      <p:pic>
+        <p:nvPicPr>
+          <p:cNvPr id="6" name="Picture 5">
+            <a:extLst>
+              <a:ext uri="{FF2B5EF4-FFF2-40B4-BE49-F238E27FC236}">
+                <a16:creationId xmlns:a16="http://schemas.microsoft.com/office/drawing/2014/main" id="{9060D93E-C98B-B042-A783-CB00914F43F2}"/>
+              </a:ext>
+            </a:extLst>
+          </p:cNvPr>
+          <p:cNvPicPr>
+            <a:picLocks noChangeAspect="1"/>
+          </p:cNvPicPr>
+          <p:nvPr/>
+        </p:nvPicPr>
+        <p:blipFill>
+          <a:blip r:embed="rId2"/>
+          <a:stretch>
+            <a:fillRect/>
+          </a:stretch>
+        </p:blipFill>
+        <p:spPr>
+          <a:xfrm>
+            <a:off x="1742745" y="744071"/>
+            <a:ext cx="4667019" cy="4117016"/>
+          </a:xfrm>
+          <a:prstGeom prst="rect">
+            <a:avLst/>
+          </a:prstGeom>
+        </p:spPr>
+      </p:pic>
+      <p:sp>
+        <p:nvSpPr>
+          <p:cNvPr id="2" name="TextBox 1">
+            <a:extLst>
+              <a:ext uri="{FF2B5EF4-FFF2-40B4-BE49-F238E27FC236}">
+                <a16:creationId xmlns:a16="http://schemas.microsoft.com/office/drawing/2014/main" id="{38A108EA-5807-A441-8AA1-149016DF3251}"/>
+              </a:ext>
+            </a:extLst>
+          </p:cNvPr>
+          <p:cNvSpPr txBox="1"/>
+          <p:nvPr/>
+        </p:nvSpPr>
+        <p:spPr>
+          <a:xfrm>
+            <a:off x="887506" y="5285553"/>
+            <a:ext cx="7007368" cy="646331"/>
+          </a:xfrm>
+          <a:prstGeom prst="rect">
+            <a:avLst/>
+          </a:prstGeom>
+          <a:noFill/>
+        </p:spPr>
+        <p:txBody>
+          <a:bodyPr wrap="none" rtlCol="0">
+            <a:spAutoFit/>
+          </a:bodyPr>
+          <a:lstStyle/>
+          <a:p>
+            <a:pPr algn="ctr"/>
+            <a:r>
+              <a:rPr lang="en-US" dirty="0"/>
+              <a:t>“A bagel and cream cheese (also known as bagel with cream cheese) is a </a:t>
+            </a:r>
+          </a:p>
+          <a:p>
+            <a:pPr algn="ctr"/>
+            <a:r>
+              <a:rPr lang="en-US" dirty="0"/>
+              <a:t>common food pairing in American cuisine.”</a:t>
+            </a:r>
+          </a:p>
+        </p:txBody>
+      </p:sp>
+      <p:sp>
+        <p:nvSpPr>
+          <p:cNvPr id="3" name="TextBox 2">
+            <a:extLst>
+              <a:ext uri="{FF2B5EF4-FFF2-40B4-BE49-F238E27FC236}">
+                <a16:creationId xmlns:a16="http://schemas.microsoft.com/office/drawing/2014/main" id="{27B43A53-99B1-F943-B8CE-CE0FBC642659}"/>
+              </a:ext>
+            </a:extLst>
+          </p:cNvPr>
+          <p:cNvSpPr txBox="1"/>
+          <p:nvPr/>
+        </p:nvSpPr>
+        <p:spPr>
+          <a:xfrm>
+            <a:off x="5592876" y="744071"/>
+            <a:ext cx="3093924" cy="646331"/>
+          </a:xfrm>
+          <a:prstGeom prst="rect">
+            <a:avLst/>
+          </a:prstGeom>
+          <a:noFill/>
+        </p:spPr>
+        <p:txBody>
+          <a:bodyPr wrap="none" rtlCol="0">
+            <a:spAutoFit/>
+          </a:bodyPr>
+          <a:lstStyle/>
+          <a:p>
+            <a:r>
+              <a:rPr lang="en-US" b="1" dirty="0">
+                <a:solidFill>
+                  <a:srgbClr val="0070C0"/>
+                </a:solidFill>
+              </a:rPr>
+              <a:t>Blue</a:t>
+            </a:r>
+            <a:r>
+              <a:rPr lang="en-US" dirty="0"/>
+              <a:t>: input (or center) vector</a:t>
+            </a:r>
+          </a:p>
+          <a:p>
+            <a:r>
+              <a:rPr lang="en-US" b="1" dirty="0">
+                <a:solidFill>
+                  <a:srgbClr val="FF0000"/>
+                </a:solidFill>
+              </a:rPr>
+              <a:t>Red</a:t>
+            </a:r>
+            <a:r>
+              <a:rPr lang="en-US" dirty="0"/>
+              <a:t>: output (or context) vector</a:t>
+            </a:r>
+          </a:p>
+        </p:txBody>
+      </p:sp>
     </p:spTree>
     <p:extLst>
       <p:ext uri="{BB962C8B-B14F-4D97-AF65-F5344CB8AC3E}">
-        <p14:creationId xmlns:p14="http://schemas.microsoft.com/office/powerpoint/2010/main" val="147176148"/>
+        <p14:creationId xmlns:p14="http://schemas.microsoft.com/office/powerpoint/2010/main" val="3515326172"/>
       </p:ext>
     </p:extLst>
   </p:cSld>
@@ -13320,10 +13442,10 @@
       </p:grpSpPr>
       <p:sp>
         <p:nvSpPr>
-          <p:cNvPr id="2" name="Title 1">
-            <a:extLst>
-              <a:ext uri="{FF2B5EF4-FFF2-40B4-BE49-F238E27FC236}">
-                <a16:creationId xmlns:a16="http://schemas.microsoft.com/office/drawing/2014/main" id="{E6BB8D59-589E-254B-8F07-A44D0BAAC373}"/>
+          <p:cNvPr id="3" name="Title 2">
+            <a:extLst>
+              <a:ext uri="{FF2B5EF4-FFF2-40B4-BE49-F238E27FC236}">
+                <a16:creationId xmlns:a16="http://schemas.microsoft.com/office/drawing/2014/main" id="{346D13A3-9B8A-144A-A5CF-9623D22F4DE0}"/>
               </a:ext>
             </a:extLst>
           </p:cNvPr>
@@ -13341,17 +13463,17 @@
           <a:p>
             <a:r>
               <a:rPr lang="en-US" dirty="0"/>
-              <a:t>Formalization</a:t>
-            </a:r>
-          </a:p>
-        </p:txBody>
-      </p:sp>
-      <p:sp>
-        <p:nvSpPr>
-          <p:cNvPr id="3" name="Content Placeholder 2">
-            <a:extLst>
-              <a:ext uri="{FF2B5EF4-FFF2-40B4-BE49-F238E27FC236}">
-                <a16:creationId xmlns:a16="http://schemas.microsoft.com/office/drawing/2014/main" id="{0266093A-1DBC-A54D-A5EE-80DDCEC642E6}"/>
+              <a:t>Intuition: push/pull</a:t>
+            </a:r>
+          </a:p>
+        </p:txBody>
+      </p:sp>
+      <p:sp>
+        <p:nvSpPr>
+          <p:cNvPr id="4" name="Content Placeholder 3">
+            <a:extLst>
+              <a:ext uri="{FF2B5EF4-FFF2-40B4-BE49-F238E27FC236}">
+                <a16:creationId xmlns:a16="http://schemas.microsoft.com/office/drawing/2014/main" id="{1B82B699-97BF-7B4A-84CF-48420A5E5FCB}"/>
               </a:ext>
             </a:extLst>
           </p:cNvPr>
@@ -13368,32 +13490,32 @@
           <a:lstStyle/>
           <a:p>
             <a:r>
+              <a:rPr lang="en-US" i="1" dirty="0"/>
+              <a:t>Pull</a:t>
+            </a:r>
+            <a:r>
               <a:rPr lang="en-US" dirty="0"/>
-              <a:t>Train as a language model:</a:t>
-            </a:r>
-          </a:p>
-          <a:p>
-            <a:pPr lvl="1"/>
+              <a:t> the red vectors for words in context closer to the blue vector for the center word</a:t>
+            </a:r>
+          </a:p>
+          <a:p>
+            <a:r>
+              <a:rPr lang="en-US" i="1" dirty="0"/>
+              <a:t>Push</a:t>
+            </a:r>
             <a:r>
               <a:rPr lang="en-US" dirty="0"/>
-              <a:t>Consider a window of [-c, +c] words around each word in a text</a:t>
-            </a:r>
-          </a:p>
-          <a:p>
-            <a:pPr lvl="1"/>
-            <a:r>
-              <a:rPr lang="en-US" dirty="0"/>
-              <a:t>Learn to predict the context words, i.e., words in this window, given the center word</a:t>
-            </a:r>
-          </a:p>
-        </p:txBody>
-      </p:sp>
-      <p:sp>
-        <p:nvSpPr>
-          <p:cNvPr id="4" name="Slide Number Placeholder 3">
-            <a:extLst>
-              <a:ext uri="{FF2B5EF4-FFF2-40B4-BE49-F238E27FC236}">
-                <a16:creationId xmlns:a16="http://schemas.microsoft.com/office/drawing/2014/main" id="{8018EB21-52A1-CB4D-98D4-66ECFBBD7C41}"/>
+              <a:t> the red vectors for words not in context away </a:t>
+            </a:r>
+          </a:p>
+        </p:txBody>
+      </p:sp>
+      <p:sp>
+        <p:nvSpPr>
+          <p:cNvPr id="2" name="Slide Number Placeholder 1">
+            <a:extLst>
+              <a:ext uri="{FF2B5EF4-FFF2-40B4-BE49-F238E27FC236}">
+                <a16:creationId xmlns:a16="http://schemas.microsoft.com/office/drawing/2014/main" id="{2CE16E76-060B-D342-98DF-25D4A685B420}"/>
               </a:ext>
             </a:extLst>
           </p:cNvPr>
@@ -13420,7 +13542,7 @@
     </p:spTree>
     <p:extLst>
       <p:ext uri="{BB962C8B-B14F-4D97-AF65-F5344CB8AC3E}">
-        <p14:creationId xmlns:p14="http://schemas.microsoft.com/office/powerpoint/2010/main" val="1081522533"/>
+        <p14:creationId xmlns:p14="http://schemas.microsoft.com/office/powerpoint/2010/main" val="147176148"/>
       </p:ext>
     </p:extLst>
   </p:cSld>
@@ -13449,10 +13571,10 @@
       </p:grpSpPr>
       <p:sp>
         <p:nvSpPr>
-          <p:cNvPr id="3" name="Title 2">
-            <a:extLst>
-              <a:ext uri="{FF2B5EF4-FFF2-40B4-BE49-F238E27FC236}">
-                <a16:creationId xmlns:a16="http://schemas.microsoft.com/office/drawing/2014/main" id="{FB836F9D-1D3F-824E-AF0E-994E6137203B}"/>
+          <p:cNvPr id="2" name="Title 1">
+            <a:extLst>
+              <a:ext uri="{FF2B5EF4-FFF2-40B4-BE49-F238E27FC236}">
+                <a16:creationId xmlns:a16="http://schemas.microsoft.com/office/drawing/2014/main" id="{E6BB8D59-589E-254B-8F07-A44D0BAAC373}"/>
               </a:ext>
             </a:extLst>
           </p:cNvPr>
@@ -13477,10 +13599,52 @@
       </p:sp>
       <p:sp>
         <p:nvSpPr>
-          <p:cNvPr id="2" name="Slide Number Placeholder 1">
-            <a:extLst>
-              <a:ext uri="{FF2B5EF4-FFF2-40B4-BE49-F238E27FC236}">
-                <a16:creationId xmlns:a16="http://schemas.microsoft.com/office/drawing/2014/main" id="{A3D0F7C1-6068-C84F-B7F4-F50861733310}"/>
+          <p:cNvPr id="3" name="Content Placeholder 2">
+            <a:extLst>
+              <a:ext uri="{FF2B5EF4-FFF2-40B4-BE49-F238E27FC236}">
+                <a16:creationId xmlns:a16="http://schemas.microsoft.com/office/drawing/2014/main" id="{0266093A-1DBC-A54D-A5EE-80DDCEC642E6}"/>
+              </a:ext>
+            </a:extLst>
+          </p:cNvPr>
+          <p:cNvSpPr>
+            <a:spLocks noGrp="1"/>
+          </p:cNvSpPr>
+          <p:nvPr>
+            <p:ph idx="1"/>
+          </p:nvPr>
+        </p:nvSpPr>
+        <p:spPr/>
+        <p:txBody>
+          <a:bodyPr/>
+          <a:lstStyle/>
+          <a:p>
+            <a:r>
+              <a:rPr lang="en-US" dirty="0"/>
+              <a:t>Train as a language model:</a:t>
+            </a:r>
+          </a:p>
+          <a:p>
+            <a:pPr lvl="1"/>
+            <a:r>
+              <a:rPr lang="en-US" dirty="0"/>
+              <a:t>Consider a window of [-c, +c] words around each word in a text</a:t>
+            </a:r>
+          </a:p>
+          <a:p>
+            <a:pPr lvl="1"/>
+            <a:r>
+              <a:rPr lang="en-US" dirty="0"/>
+              <a:t>Learn to predict the context words, i.e., words in this window, given the center word</a:t>
+            </a:r>
+          </a:p>
+        </p:txBody>
+      </p:sp>
+      <p:sp>
+        <p:nvSpPr>
+          <p:cNvPr id="4" name="Slide Number Placeholder 3">
+            <a:extLst>
+              <a:ext uri="{FF2B5EF4-FFF2-40B4-BE49-F238E27FC236}">
+                <a16:creationId xmlns:a16="http://schemas.microsoft.com/office/drawing/2014/main" id="{8018EB21-52A1-CB4D-98D4-66ECFBBD7C41}"/>
               </a:ext>
             </a:extLst>
           </p:cNvPr>
@@ -13499,6 +13663,93 @@
             <a:fld id="{FF5157AA-4A4D-2C48-B0F6-C526C028AE97}" type="slidenum">
               <a:rPr lang="en-US" smtClean="0"/>
               <a:t>31</a:t>
+            </a:fld>
+            <a:endParaRPr lang="en-US"/>
+          </a:p>
+        </p:txBody>
+      </p:sp>
+    </p:spTree>
+    <p:extLst>
+      <p:ext uri="{BB962C8B-B14F-4D97-AF65-F5344CB8AC3E}">
+        <p14:creationId xmlns:p14="http://schemas.microsoft.com/office/powerpoint/2010/main" val="1081522533"/>
+      </p:ext>
+    </p:extLst>
+  </p:cSld>
+  <p:clrMapOvr>
+    <a:masterClrMapping/>
+  </p:clrMapOvr>
+</p:sld>
+</file>
+
+<file path=ppt/slides/slide32.xml><?xml version="1.0" encoding="utf-8"?>
+<p:sld xmlns:a="http://schemas.openxmlformats.org/drawingml/2006/main" xmlns:r="http://schemas.openxmlformats.org/officeDocument/2006/relationships" xmlns:p="http://schemas.openxmlformats.org/presentationml/2006/main">
+  <p:cSld>
+    <p:spTree>
+      <p:nvGrpSpPr>
+        <p:cNvPr id="1" name=""/>
+        <p:cNvGrpSpPr/>
+        <p:nvPr/>
+      </p:nvGrpSpPr>
+      <p:grpSpPr>
+        <a:xfrm>
+          <a:off x="0" y="0"/>
+          <a:ext cx="0" cy="0"/>
+          <a:chOff x="0" y="0"/>
+          <a:chExt cx="0" cy="0"/>
+        </a:xfrm>
+      </p:grpSpPr>
+      <p:sp>
+        <p:nvSpPr>
+          <p:cNvPr id="3" name="Title 2">
+            <a:extLst>
+              <a:ext uri="{FF2B5EF4-FFF2-40B4-BE49-F238E27FC236}">
+                <a16:creationId xmlns:a16="http://schemas.microsoft.com/office/drawing/2014/main" id="{FB836F9D-1D3F-824E-AF0E-994E6137203B}"/>
+              </a:ext>
+            </a:extLst>
+          </p:cNvPr>
+          <p:cNvSpPr>
+            <a:spLocks noGrp="1"/>
+          </p:cNvSpPr>
+          <p:nvPr>
+            <p:ph type="title"/>
+          </p:nvPr>
+        </p:nvSpPr>
+        <p:spPr/>
+        <p:txBody>
+          <a:bodyPr/>
+          <a:lstStyle/>
+          <a:p>
+            <a:r>
+              <a:rPr lang="en-US" dirty="0"/>
+              <a:t>Formalization</a:t>
+            </a:r>
+          </a:p>
+        </p:txBody>
+      </p:sp>
+      <p:sp>
+        <p:nvSpPr>
+          <p:cNvPr id="2" name="Slide Number Placeholder 1">
+            <a:extLst>
+              <a:ext uri="{FF2B5EF4-FFF2-40B4-BE49-F238E27FC236}">
+                <a16:creationId xmlns:a16="http://schemas.microsoft.com/office/drawing/2014/main" id="{A3D0F7C1-6068-C84F-B7F4-F50861733310}"/>
+              </a:ext>
+            </a:extLst>
+          </p:cNvPr>
+          <p:cNvSpPr>
+            <a:spLocks noGrp="1"/>
+          </p:cNvSpPr>
+          <p:nvPr>
+            <p:ph type="sldNum" sz="quarter" idx="12"/>
+          </p:nvPr>
+        </p:nvSpPr>
+        <p:spPr/>
+        <p:txBody>
+          <a:bodyPr/>
+          <a:lstStyle/>
+          <a:p>
+            <a:fld id="{FF5157AA-4A4D-2C48-B0F6-C526C028AE97}" type="slidenum">
+              <a:rPr lang="en-US" smtClean="0"/>
+              <a:t>32</a:t>
             </a:fld>
             <a:endParaRPr lang="en-US"/>
           </a:p>
@@ -13776,200 +14027,6 @@
 </p:sld>
 </file>
 
-<file path=ppt/slides/slide32.xml><?xml version="1.0" encoding="utf-8"?>
-<p:sld xmlns:a="http://schemas.openxmlformats.org/drawingml/2006/main" xmlns:r="http://schemas.openxmlformats.org/officeDocument/2006/relationships" xmlns:p="http://schemas.openxmlformats.org/presentationml/2006/main">
-  <p:cSld>
-    <p:spTree>
-      <p:nvGrpSpPr>
-        <p:cNvPr id="1" name=""/>
-        <p:cNvGrpSpPr/>
-        <p:nvPr/>
-      </p:nvGrpSpPr>
-      <p:grpSpPr>
-        <a:xfrm>
-          <a:off x="0" y="0"/>
-          <a:ext cx="0" cy="0"/>
-          <a:chOff x="0" y="0"/>
-          <a:chExt cx="0" cy="0"/>
-        </a:xfrm>
-      </p:grpSpPr>
-      <p:sp>
-        <p:nvSpPr>
-          <p:cNvPr id="2" name="Title 1">
-            <a:extLst>
-              <a:ext uri="{FF2B5EF4-FFF2-40B4-BE49-F238E27FC236}">
-                <a16:creationId xmlns:a16="http://schemas.microsoft.com/office/drawing/2014/main" id="{CEB9F19A-E142-0C46-8AB6-283D7D3573FE}"/>
-              </a:ext>
-            </a:extLst>
-          </p:cNvPr>
-          <p:cNvSpPr>
-            <a:spLocks noGrp="1"/>
-          </p:cNvSpPr>
-          <p:nvPr>
-            <p:ph type="title"/>
-          </p:nvPr>
-        </p:nvSpPr>
-        <p:spPr/>
-        <p:txBody>
-          <a:bodyPr/>
-          <a:lstStyle/>
-          <a:p>
-            <a:r>
-              <a:rPr lang="en-US" dirty="0"/>
-              <a:t>Difference from LR</a:t>
-            </a:r>
-          </a:p>
-        </p:txBody>
-      </p:sp>
-      <p:sp>
-        <p:nvSpPr>
-          <p:cNvPr id="4" name="Content Placeholder 3">
-            <a:extLst>
-              <a:ext uri="{FF2B5EF4-FFF2-40B4-BE49-F238E27FC236}">
-                <a16:creationId xmlns:a16="http://schemas.microsoft.com/office/drawing/2014/main" id="{A4CCEFB8-C100-F24D-B36D-20E2C20F556F}"/>
-              </a:ext>
-            </a:extLst>
-          </p:cNvPr>
-          <p:cNvSpPr>
-            <a:spLocks noGrp="1"/>
-          </p:cNvSpPr>
-          <p:nvPr>
-            <p:ph idx="1"/>
-          </p:nvPr>
-        </p:nvSpPr>
-        <p:spPr/>
-        <p:txBody>
-          <a:bodyPr>
-            <a:normAutofit fontScale="85000" lnSpcReduction="10000"/>
-          </a:bodyPr>
-          <a:lstStyle/>
-          <a:p>
-            <a:r>
-              <a:rPr lang="en-US" dirty="0"/>
-              <a:t>The v</a:t>
-            </a:r>
-            <a:r>
-              <a:rPr lang="en-US" baseline="30000" dirty="0"/>
-              <a:t>i</a:t>
-            </a:r>
-            <a:r>
-              <a:rPr lang="en-US" dirty="0"/>
-              <a:t> and </a:t>
-            </a:r>
-            <a:r>
-              <a:rPr lang="en-US" dirty="0" err="1"/>
-              <a:t>v</a:t>
-            </a:r>
-            <a:r>
-              <a:rPr lang="en-US" baseline="30000" dirty="0" err="1"/>
-              <a:t>o</a:t>
-            </a:r>
-            <a:r>
-              <a:rPr lang="en-US" dirty="0"/>
-              <a:t> are learned during training, whereas for traditional LR, the feature vectors are static (they do not change)</a:t>
-            </a:r>
-          </a:p>
-          <a:p>
-            <a:pPr lvl="1"/>
-            <a:r>
-              <a:rPr lang="en-US" dirty="0"/>
-              <a:t>Word2vec has been described as “dynamic LR”</a:t>
-            </a:r>
-          </a:p>
-          <a:p>
-            <a:r>
-              <a:rPr lang="en-US" dirty="0"/>
-              <a:t>The v</a:t>
-            </a:r>
-            <a:r>
-              <a:rPr lang="en-US" baseline="30000" dirty="0"/>
-              <a:t>i</a:t>
-            </a:r>
-            <a:r>
-              <a:rPr lang="en-US" dirty="0"/>
-              <a:t> and </a:t>
-            </a:r>
-            <a:r>
-              <a:rPr lang="en-US" dirty="0" err="1"/>
-              <a:t>v</a:t>
-            </a:r>
-            <a:r>
-              <a:rPr lang="en-US" baseline="30000" dirty="0" err="1"/>
-              <a:t>o</a:t>
-            </a:r>
-            <a:r>
-              <a:rPr lang="en-US" baseline="30000" dirty="0"/>
-              <a:t> </a:t>
-            </a:r>
-            <a:r>
-              <a:rPr lang="en-US" dirty="0"/>
-              <a:t>are simply coordinates in a multi-dimensional space </a:t>
-            </a:r>
-          </a:p>
-          <a:p>
-            <a:pPr lvl="1"/>
-            <a:r>
-              <a:rPr lang="en-US" dirty="0"/>
-              <a:t>Hard to interpret!</a:t>
-            </a:r>
-          </a:p>
-          <a:p>
-            <a:r>
-              <a:rPr lang="en-US" dirty="0"/>
-              <a:t>The number of classes to learn for word2vec is very large (approximately the size of the vocabulary because any word may appear in some context)</a:t>
-            </a:r>
-          </a:p>
-          <a:p>
-            <a:pPr lvl="1"/>
-            <a:r>
-              <a:rPr lang="en-US" dirty="0"/>
-              <a:t>Need an approximated cost function</a:t>
-            </a:r>
-          </a:p>
-        </p:txBody>
-      </p:sp>
-      <p:sp>
-        <p:nvSpPr>
-          <p:cNvPr id="3" name="Slide Number Placeholder 2">
-            <a:extLst>
-              <a:ext uri="{FF2B5EF4-FFF2-40B4-BE49-F238E27FC236}">
-                <a16:creationId xmlns:a16="http://schemas.microsoft.com/office/drawing/2014/main" id="{C0409847-930F-B04F-86F1-1B56B72F80EB}"/>
-              </a:ext>
-            </a:extLst>
-          </p:cNvPr>
-          <p:cNvSpPr>
-            <a:spLocks noGrp="1"/>
-          </p:cNvSpPr>
-          <p:nvPr>
-            <p:ph type="sldNum" sz="quarter" idx="12"/>
-          </p:nvPr>
-        </p:nvSpPr>
-        <p:spPr/>
-        <p:txBody>
-          <a:bodyPr/>
-          <a:lstStyle/>
-          <a:p>
-            <a:fld id="{FF5157AA-4A4D-2C48-B0F6-C526C028AE97}" type="slidenum">
-              <a:rPr lang="en-US" smtClean="0"/>
-              <a:t>32</a:t>
-            </a:fld>
-            <a:endParaRPr lang="en-US"/>
-          </a:p>
-        </p:txBody>
-      </p:sp>
-    </p:spTree>
-    <p:extLst>
-      <p:ext uri="{BB962C8B-B14F-4D97-AF65-F5344CB8AC3E}">
-        <p14:creationId xmlns:p14="http://schemas.microsoft.com/office/powerpoint/2010/main" val="782034216"/>
-      </p:ext>
-    </p:extLst>
-  </p:cSld>
-  <p:clrMapOvr>
-    <a:masterClrMapping/>
-  </p:clrMapOvr>
-</p:sld>
-</file>
-
 <file path=ppt/slides/slide33.xml><?xml version="1.0" encoding="utf-8"?>
 <p:sld xmlns:a="http://schemas.openxmlformats.org/drawingml/2006/main" xmlns:r="http://schemas.openxmlformats.org/officeDocument/2006/relationships" xmlns:p="http://schemas.openxmlformats.org/presentationml/2006/main">
   <p:cSld>
@@ -13989,10 +14046,10 @@
       </p:grpSpPr>
       <p:sp>
         <p:nvSpPr>
-          <p:cNvPr id="3" name="Title 2">
-            <a:extLst>
-              <a:ext uri="{FF2B5EF4-FFF2-40B4-BE49-F238E27FC236}">
-                <a16:creationId xmlns:a16="http://schemas.microsoft.com/office/drawing/2014/main" id="{1EB147B6-C948-104A-AF87-6DC2627C0531}"/>
+          <p:cNvPr id="2" name="Title 1">
+            <a:extLst>
+              <a:ext uri="{FF2B5EF4-FFF2-40B4-BE49-F238E27FC236}">
+                <a16:creationId xmlns:a16="http://schemas.microsoft.com/office/drawing/2014/main" id="{CEB9F19A-E142-0C46-8AB6-283D7D3573FE}"/>
               </a:ext>
             </a:extLst>
           </p:cNvPr>
@@ -14010,17 +14067,124 @@
           <a:p>
             <a:r>
               <a:rPr lang="en-US" dirty="0"/>
-              <a:t>Actual cost function for word2vec</a:t>
-            </a:r>
-          </a:p>
-        </p:txBody>
-      </p:sp>
-      <p:sp>
-        <p:nvSpPr>
-          <p:cNvPr id="2" name="Slide Number Placeholder 1">
-            <a:extLst>
-              <a:ext uri="{FF2B5EF4-FFF2-40B4-BE49-F238E27FC236}">
-                <a16:creationId xmlns:a16="http://schemas.microsoft.com/office/drawing/2014/main" id="{60759935-6728-7149-B1B8-97956C27B6C9}"/>
+              <a:t>Difference from LR</a:t>
+            </a:r>
+          </a:p>
+        </p:txBody>
+      </p:sp>
+      <p:sp>
+        <p:nvSpPr>
+          <p:cNvPr id="4" name="Content Placeholder 3">
+            <a:extLst>
+              <a:ext uri="{FF2B5EF4-FFF2-40B4-BE49-F238E27FC236}">
+                <a16:creationId xmlns:a16="http://schemas.microsoft.com/office/drawing/2014/main" id="{A4CCEFB8-C100-F24D-B36D-20E2C20F556F}"/>
+              </a:ext>
+            </a:extLst>
+          </p:cNvPr>
+          <p:cNvSpPr>
+            <a:spLocks noGrp="1"/>
+          </p:cNvSpPr>
+          <p:nvPr>
+            <p:ph idx="1"/>
+          </p:nvPr>
+        </p:nvSpPr>
+        <p:spPr/>
+        <p:txBody>
+          <a:bodyPr>
+            <a:normAutofit fontScale="85000" lnSpcReduction="10000"/>
+          </a:bodyPr>
+          <a:lstStyle/>
+          <a:p>
+            <a:r>
+              <a:rPr lang="en-US" dirty="0"/>
+              <a:t>The v</a:t>
+            </a:r>
+            <a:r>
+              <a:rPr lang="en-US" baseline="30000" dirty="0"/>
+              <a:t>i</a:t>
+            </a:r>
+            <a:r>
+              <a:rPr lang="en-US" dirty="0"/>
+              <a:t> and </a:t>
+            </a:r>
+            <a:r>
+              <a:rPr lang="en-US" dirty="0" err="1"/>
+              <a:t>v</a:t>
+            </a:r>
+            <a:r>
+              <a:rPr lang="en-US" baseline="30000" dirty="0" err="1"/>
+              <a:t>o</a:t>
+            </a:r>
+            <a:r>
+              <a:rPr lang="en-US" dirty="0"/>
+              <a:t> are learned during training, whereas for traditional LR, the feature vectors are static (they do not change)</a:t>
+            </a:r>
+          </a:p>
+          <a:p>
+            <a:pPr lvl="1"/>
+            <a:r>
+              <a:rPr lang="en-US" dirty="0"/>
+              <a:t>Word2vec has been described as “dynamic LR”</a:t>
+            </a:r>
+          </a:p>
+          <a:p>
+            <a:r>
+              <a:rPr lang="en-US" dirty="0"/>
+              <a:t>The v</a:t>
+            </a:r>
+            <a:r>
+              <a:rPr lang="en-US" baseline="30000" dirty="0"/>
+              <a:t>i</a:t>
+            </a:r>
+            <a:r>
+              <a:rPr lang="en-US" dirty="0"/>
+              <a:t> and </a:t>
+            </a:r>
+            <a:r>
+              <a:rPr lang="en-US" dirty="0" err="1"/>
+              <a:t>v</a:t>
+            </a:r>
+            <a:r>
+              <a:rPr lang="en-US" baseline="30000" dirty="0" err="1"/>
+              <a:t>o</a:t>
+            </a:r>
+            <a:r>
+              <a:rPr lang="en-US" baseline="30000" dirty="0"/>
+              <a:t> </a:t>
+            </a:r>
+            <a:r>
+              <a:rPr lang="en-US" dirty="0"/>
+              <a:t>are simply coordinates in a multi-dimensional space </a:t>
+            </a:r>
+          </a:p>
+          <a:p>
+            <a:pPr lvl="1"/>
+            <a:r>
+              <a:rPr lang="en-US" dirty="0"/>
+              <a:t>Hard to interpret!</a:t>
+            </a:r>
+          </a:p>
+          <a:p>
+            <a:r>
+              <a:rPr lang="en-US" dirty="0"/>
+              <a:t>The number of classes to learn for word2vec is very large (approximately the size of the vocabulary because any word may appear in some context)</a:t>
+            </a:r>
+          </a:p>
+          <a:p>
+            <a:pPr lvl="1"/>
+            <a:r>
+              <a:rPr lang="en-US" dirty="0"/>
+              <a:t>Need an approximated cost function</a:t>
+            </a:r>
+          </a:p>
+        </p:txBody>
+      </p:sp>
+      <p:sp>
+        <p:nvSpPr>
+          <p:cNvPr id="3" name="Slide Number Placeholder 2">
+            <a:extLst>
+              <a:ext uri="{FF2B5EF4-FFF2-40B4-BE49-F238E27FC236}">
+                <a16:creationId xmlns:a16="http://schemas.microsoft.com/office/drawing/2014/main" id="{C0409847-930F-B04F-86F1-1B56B72F80EB}"/>
               </a:ext>
             </a:extLst>
           </p:cNvPr>
@@ -14039,6 +14203,93 @@
             <a:fld id="{FF5157AA-4A4D-2C48-B0F6-C526C028AE97}" type="slidenum">
               <a:rPr lang="en-US" smtClean="0"/>
               <a:t>33</a:t>
+            </a:fld>
+            <a:endParaRPr lang="en-US"/>
+          </a:p>
+        </p:txBody>
+      </p:sp>
+    </p:spTree>
+    <p:extLst>
+      <p:ext uri="{BB962C8B-B14F-4D97-AF65-F5344CB8AC3E}">
+        <p14:creationId xmlns:p14="http://schemas.microsoft.com/office/powerpoint/2010/main" val="782034216"/>
+      </p:ext>
+    </p:extLst>
+  </p:cSld>
+  <p:clrMapOvr>
+    <a:masterClrMapping/>
+  </p:clrMapOvr>
+</p:sld>
+</file>
+
+<file path=ppt/slides/slide34.xml><?xml version="1.0" encoding="utf-8"?>
+<p:sld xmlns:a="http://schemas.openxmlformats.org/drawingml/2006/main" xmlns:r="http://schemas.openxmlformats.org/officeDocument/2006/relationships" xmlns:p="http://schemas.openxmlformats.org/presentationml/2006/main">
+  <p:cSld>
+    <p:spTree>
+      <p:nvGrpSpPr>
+        <p:cNvPr id="1" name=""/>
+        <p:cNvGrpSpPr/>
+        <p:nvPr/>
+      </p:nvGrpSpPr>
+      <p:grpSpPr>
+        <a:xfrm>
+          <a:off x="0" y="0"/>
+          <a:ext cx="0" cy="0"/>
+          <a:chOff x="0" y="0"/>
+          <a:chExt cx="0" cy="0"/>
+        </a:xfrm>
+      </p:grpSpPr>
+      <p:sp>
+        <p:nvSpPr>
+          <p:cNvPr id="3" name="Title 2">
+            <a:extLst>
+              <a:ext uri="{FF2B5EF4-FFF2-40B4-BE49-F238E27FC236}">
+                <a16:creationId xmlns:a16="http://schemas.microsoft.com/office/drawing/2014/main" id="{1EB147B6-C948-104A-AF87-6DC2627C0531}"/>
+              </a:ext>
+            </a:extLst>
+          </p:cNvPr>
+          <p:cNvSpPr>
+            <a:spLocks noGrp="1"/>
+          </p:cNvSpPr>
+          <p:nvPr>
+            <p:ph type="title"/>
+          </p:nvPr>
+        </p:nvSpPr>
+        <p:spPr/>
+        <p:txBody>
+          <a:bodyPr/>
+          <a:lstStyle/>
+          <a:p>
+            <a:r>
+              <a:rPr lang="en-US" dirty="0"/>
+              <a:t>Actual cost function for word2vec</a:t>
+            </a:r>
+          </a:p>
+        </p:txBody>
+      </p:sp>
+      <p:sp>
+        <p:nvSpPr>
+          <p:cNvPr id="2" name="Slide Number Placeholder 1">
+            <a:extLst>
+              <a:ext uri="{FF2B5EF4-FFF2-40B4-BE49-F238E27FC236}">
+                <a16:creationId xmlns:a16="http://schemas.microsoft.com/office/drawing/2014/main" id="{60759935-6728-7149-B1B8-97956C27B6C9}"/>
+              </a:ext>
+            </a:extLst>
+          </p:cNvPr>
+          <p:cNvSpPr>
+            <a:spLocks noGrp="1"/>
+          </p:cNvSpPr>
+          <p:nvPr>
+            <p:ph type="sldNum" sz="quarter" idx="12"/>
+          </p:nvPr>
+        </p:nvSpPr>
+        <p:spPr/>
+        <p:txBody>
+          <a:bodyPr/>
+          <a:lstStyle/>
+          <a:p>
+            <a:fld id="{FF5157AA-4A4D-2C48-B0F6-C526C028AE97}" type="slidenum">
+              <a:rPr lang="en-US" smtClean="0"/>
+              <a:t>34</a:t>
             </a:fld>
             <a:endParaRPr lang="en-US"/>
           </a:p>
@@ -14388,7 +14639,7 @@
 </p:sld>
 </file>
 
-<file path=ppt/slides/slide34.xml><?xml version="1.0" encoding="utf-8"?>
+<file path=ppt/slides/slide35.xml><?xml version="1.0" encoding="utf-8"?>
 <p:sld xmlns:a="http://schemas.openxmlformats.org/drawingml/2006/main" xmlns:r="http://schemas.openxmlformats.org/officeDocument/2006/relationships" xmlns:p="http://schemas.openxmlformats.org/presentationml/2006/main">
   <p:cSld>
     <p:spTree>
@@ -14428,7 +14679,7 @@
           <a:p>
             <a:fld id="{FF5157AA-4A4D-2C48-B0F6-C526C028AE97}" type="slidenum">
               <a:rPr lang="en-US" smtClean="0"/>
-              <a:t>34</a:t>
+              <a:t>35</a:t>
             </a:fld>
             <a:endParaRPr lang="en-US"/>
           </a:p>
@@ -14477,7 +14728,7 @@
 </p:sld>
 </file>
 
-<file path=ppt/slides/slide35.xml><?xml version="1.0" encoding="utf-8"?>
+<file path=ppt/slides/slide36.xml><?xml version="1.0" encoding="utf-8"?>
 <p:sld xmlns:a="http://schemas.openxmlformats.org/drawingml/2006/main" xmlns:r="http://schemas.openxmlformats.org/officeDocument/2006/relationships" xmlns:p="http://schemas.openxmlformats.org/presentationml/2006/main">
   <p:cSld>
     <p:spTree>
@@ -14545,7 +14796,7 @@
           <a:p>
             <a:fld id="{FF5157AA-4A4D-2C48-B0F6-C526C028AE97}" type="slidenum">
               <a:rPr lang="en-US" smtClean="0"/>
-              <a:t>35</a:t>
+              <a:t>36</a:t>
             </a:fld>
             <a:endParaRPr lang="en-US"/>
           </a:p>
@@ -14594,135 +14845,6 @@
 </p:sld>
 </file>
 
-<file path=ppt/slides/slide36.xml><?xml version="1.0" encoding="utf-8"?>
-<p:sld xmlns:a="http://schemas.openxmlformats.org/drawingml/2006/main" xmlns:r="http://schemas.openxmlformats.org/officeDocument/2006/relationships" xmlns:p="http://schemas.openxmlformats.org/presentationml/2006/main">
-  <p:cSld>
-    <p:spTree>
-      <p:nvGrpSpPr>
-        <p:cNvPr id="1" name=""/>
-        <p:cNvGrpSpPr/>
-        <p:nvPr/>
-      </p:nvGrpSpPr>
-      <p:grpSpPr>
-        <a:xfrm>
-          <a:off x="0" y="0"/>
-          <a:ext cx="0" cy="0"/>
-          <a:chOff x="0" y="0"/>
-          <a:chExt cx="0" cy="0"/>
-        </a:xfrm>
-      </p:grpSpPr>
-      <p:sp>
-        <p:nvSpPr>
-          <p:cNvPr id="2" name="Title 1">
-            <a:extLst>
-              <a:ext uri="{FF2B5EF4-FFF2-40B4-BE49-F238E27FC236}">
-                <a16:creationId xmlns:a16="http://schemas.microsoft.com/office/drawing/2014/main" id="{FCDBC09E-540A-A04C-BB25-8C760C617729}"/>
-              </a:ext>
-            </a:extLst>
-          </p:cNvPr>
-          <p:cNvSpPr>
-            <a:spLocks noGrp="1"/>
-          </p:cNvSpPr>
-          <p:nvPr>
-            <p:ph type="title"/>
-          </p:nvPr>
-        </p:nvSpPr>
-        <p:spPr/>
-        <p:txBody>
-          <a:bodyPr/>
-          <a:lstStyle/>
-          <a:p>
-            <a:r>
-              <a:rPr lang="en-US" dirty="0"/>
-              <a:t>What does word2vec learn?</a:t>
-            </a:r>
-          </a:p>
-        </p:txBody>
-      </p:sp>
-      <p:sp>
-        <p:nvSpPr>
-          <p:cNvPr id="4" name="Content Placeholder 3">
-            <a:extLst>
-              <a:ext uri="{FF2B5EF4-FFF2-40B4-BE49-F238E27FC236}">
-                <a16:creationId xmlns:a16="http://schemas.microsoft.com/office/drawing/2014/main" id="{5EAA7C2A-1E28-7C41-BB02-755BD2AF1AD3}"/>
-              </a:ext>
-            </a:extLst>
-          </p:cNvPr>
-          <p:cNvSpPr>
-            <a:spLocks noGrp="1"/>
-          </p:cNvSpPr>
-          <p:nvPr>
-            <p:ph idx="1"/>
-          </p:nvPr>
-        </p:nvSpPr>
-        <p:spPr/>
-        <p:txBody>
-          <a:bodyPr/>
-          <a:lstStyle/>
-          <a:p>
-            <a:r>
-              <a:rPr lang="en-US" dirty="0"/>
-              <a:t>The vectors capture meaningful semantics:</a:t>
-            </a:r>
-          </a:p>
-          <a:p>
-            <a:pPr lvl="1"/>
-            <a:r>
-              <a:rPr lang="en-US" dirty="0"/>
-              <a:t>v(China) – v(Beijing) = v(France) – v(Paris)</a:t>
-            </a:r>
-          </a:p>
-          <a:p>
-            <a:pPr lvl="1"/>
-            <a:r>
-              <a:rPr lang="en-US" dirty="0"/>
-              <a:t>v(king) – v(man) = v(queen) – v(woman)</a:t>
-            </a:r>
-          </a:p>
-        </p:txBody>
-      </p:sp>
-      <p:sp>
-        <p:nvSpPr>
-          <p:cNvPr id="3" name="Slide Number Placeholder 2">
-            <a:extLst>
-              <a:ext uri="{FF2B5EF4-FFF2-40B4-BE49-F238E27FC236}">
-                <a16:creationId xmlns:a16="http://schemas.microsoft.com/office/drawing/2014/main" id="{EBD7C210-5380-3F4E-A146-3D35C17223B4}"/>
-              </a:ext>
-            </a:extLst>
-          </p:cNvPr>
-          <p:cNvSpPr>
-            <a:spLocks noGrp="1"/>
-          </p:cNvSpPr>
-          <p:nvPr>
-            <p:ph type="sldNum" sz="quarter" idx="12"/>
-          </p:nvPr>
-        </p:nvSpPr>
-        <p:spPr/>
-        <p:txBody>
-          <a:bodyPr/>
-          <a:lstStyle/>
-          <a:p>
-            <a:fld id="{FF5157AA-4A4D-2C48-B0F6-C526C028AE97}" type="slidenum">
-              <a:rPr lang="en-US" smtClean="0"/>
-              <a:t>36</a:t>
-            </a:fld>
-            <a:endParaRPr lang="en-US"/>
-          </a:p>
-        </p:txBody>
-      </p:sp>
-    </p:spTree>
-    <p:extLst>
-      <p:ext uri="{BB962C8B-B14F-4D97-AF65-F5344CB8AC3E}">
-        <p14:creationId xmlns:p14="http://schemas.microsoft.com/office/powerpoint/2010/main" val="2805896220"/>
-      </p:ext>
-    </p:extLst>
-  </p:cSld>
-  <p:clrMapOvr>
-    <a:masterClrMapping/>
-  </p:clrMapOvr>
-</p:sld>
-</file>
-
 <file path=ppt/slides/slide37.xml><?xml version="1.0" encoding="utf-8"?>
 <p:sld xmlns:a="http://schemas.openxmlformats.org/drawingml/2006/main" xmlns:r="http://schemas.openxmlformats.org/officeDocument/2006/relationships" xmlns:p="http://schemas.openxmlformats.org/presentationml/2006/main">
   <p:cSld>
@@ -14742,10 +14864,10 @@
       </p:grpSpPr>
       <p:sp>
         <p:nvSpPr>
-          <p:cNvPr id="5" name="Title 4">
-            <a:extLst>
-              <a:ext uri="{FF2B5EF4-FFF2-40B4-BE49-F238E27FC236}">
-                <a16:creationId xmlns:a16="http://schemas.microsoft.com/office/drawing/2014/main" id="{C58EB79C-5A6C-7C44-A0EF-40C2BC5A0CC6}"/>
+          <p:cNvPr id="2" name="Title 1">
+            <a:extLst>
+              <a:ext uri="{FF2B5EF4-FFF2-40B4-BE49-F238E27FC236}">
+                <a16:creationId xmlns:a16="http://schemas.microsoft.com/office/drawing/2014/main" id="{FCDBC09E-540A-A04C-BB25-8C760C617729}"/>
               </a:ext>
             </a:extLst>
           </p:cNvPr>
@@ -14763,17 +14885,17 @@
           <a:p>
             <a:r>
               <a:rPr lang="en-US" dirty="0"/>
-              <a:t>Drawbacks of word2vec</a:t>
-            </a:r>
-          </a:p>
-        </p:txBody>
-      </p:sp>
-      <p:sp>
-        <p:nvSpPr>
-          <p:cNvPr id="6" name="Content Placeholder 5">
-            <a:extLst>
-              <a:ext uri="{FF2B5EF4-FFF2-40B4-BE49-F238E27FC236}">
-                <a16:creationId xmlns:a16="http://schemas.microsoft.com/office/drawing/2014/main" id="{F86B0785-ED7B-714F-BF61-9BF5D83879ED}"/>
+              <a:t>What does word2vec learn?</a:t>
+            </a:r>
+          </a:p>
+        </p:txBody>
+      </p:sp>
+      <p:sp>
+        <p:nvSpPr>
+          <p:cNvPr id="4" name="Content Placeholder 3">
+            <a:extLst>
+              <a:ext uri="{FF2B5EF4-FFF2-40B4-BE49-F238E27FC236}">
+                <a16:creationId xmlns:a16="http://schemas.microsoft.com/office/drawing/2014/main" id="{5EAA7C2A-1E28-7C41-BB02-755BD2AF1AD3}"/>
               </a:ext>
             </a:extLst>
           </p:cNvPr>
@@ -14791,55 +14913,31 @@
           <a:p>
             <a:r>
               <a:rPr lang="en-US" dirty="0"/>
-              <a:t>The numerical representations are static, i.e., they are the same for all senses of a word:</a:t>
+              <a:t>The vectors capture meaningful semantics:</a:t>
             </a:r>
           </a:p>
           <a:p>
             <a:pPr lvl="1"/>
             <a:r>
-              <a:rPr lang="en-US" i="1" dirty="0"/>
-              <a:t>Bank</a:t>
-            </a:r>
-            <a:r>
               <a:rPr lang="en-US" dirty="0"/>
-              <a:t> of the river</a:t>
+              <a:t>v(China) – v(Beijing) = v(France) – v(Paris)</a:t>
             </a:r>
           </a:p>
           <a:p>
             <a:pPr lvl="1"/>
             <a:r>
-              <a:rPr lang="en-US" i="1" dirty="0"/>
-              <a:t>Bank</a:t>
-            </a:r>
-            <a:r>
               <a:rPr lang="en-US" dirty="0"/>
-              <a:t> of America</a:t>
-            </a:r>
-          </a:p>
-          <a:p>
-            <a:r>
-              <a:rPr lang="en-US" dirty="0"/>
-              <a:t>The numerical representations capture potential biases in the textual data:</a:t>
-            </a:r>
-          </a:p>
-          <a:p>
-            <a:pPr lvl="1"/>
-            <a:r>
-              <a:rPr lang="en-US" dirty="0"/>
-              <a:t>v(doctor) – v(man) = v(nurse) – v(woman)</a:t>
-            </a:r>
-          </a:p>
-          <a:p>
-            <a:endParaRPr lang="en-US" dirty="0"/>
-          </a:p>
-        </p:txBody>
-      </p:sp>
-      <p:sp>
-        <p:nvSpPr>
-          <p:cNvPr id="4" name="Slide Number Placeholder 3">
-            <a:extLst>
-              <a:ext uri="{FF2B5EF4-FFF2-40B4-BE49-F238E27FC236}">
-                <a16:creationId xmlns:a16="http://schemas.microsoft.com/office/drawing/2014/main" id="{EF26839F-DFF4-EA4A-8B53-5444C21B4DA2}"/>
+              <a:t>v(king) – v(man) = v(queen) – v(woman)</a:t>
+            </a:r>
+          </a:p>
+        </p:txBody>
+      </p:sp>
+      <p:sp>
+        <p:nvSpPr>
+          <p:cNvPr id="3" name="Slide Number Placeholder 2">
+            <a:extLst>
+              <a:ext uri="{FF2B5EF4-FFF2-40B4-BE49-F238E27FC236}">
+                <a16:creationId xmlns:a16="http://schemas.microsoft.com/office/drawing/2014/main" id="{EBD7C210-5380-3F4E-A146-3D35C17223B4}"/>
               </a:ext>
             </a:extLst>
           </p:cNvPr>
@@ -14866,7 +14964,7 @@
     </p:spTree>
     <p:extLst>
       <p:ext uri="{BB962C8B-B14F-4D97-AF65-F5344CB8AC3E}">
-        <p14:creationId xmlns:p14="http://schemas.microsoft.com/office/powerpoint/2010/main" val="458590332"/>
+        <p14:creationId xmlns:p14="http://schemas.microsoft.com/office/powerpoint/2010/main" val="2805896220"/>
       </p:ext>
     </p:extLst>
   </p:cSld>
@@ -14895,6 +14993,159 @@
       </p:grpSpPr>
       <p:sp>
         <p:nvSpPr>
+          <p:cNvPr id="5" name="Title 4">
+            <a:extLst>
+              <a:ext uri="{FF2B5EF4-FFF2-40B4-BE49-F238E27FC236}">
+                <a16:creationId xmlns:a16="http://schemas.microsoft.com/office/drawing/2014/main" id="{C58EB79C-5A6C-7C44-A0EF-40C2BC5A0CC6}"/>
+              </a:ext>
+            </a:extLst>
+          </p:cNvPr>
+          <p:cNvSpPr>
+            <a:spLocks noGrp="1"/>
+          </p:cNvSpPr>
+          <p:nvPr>
+            <p:ph type="title"/>
+          </p:nvPr>
+        </p:nvSpPr>
+        <p:spPr/>
+        <p:txBody>
+          <a:bodyPr/>
+          <a:lstStyle/>
+          <a:p>
+            <a:r>
+              <a:rPr lang="en-US" dirty="0"/>
+              <a:t>Drawbacks of word2vec</a:t>
+            </a:r>
+          </a:p>
+        </p:txBody>
+      </p:sp>
+      <p:sp>
+        <p:nvSpPr>
+          <p:cNvPr id="6" name="Content Placeholder 5">
+            <a:extLst>
+              <a:ext uri="{FF2B5EF4-FFF2-40B4-BE49-F238E27FC236}">
+                <a16:creationId xmlns:a16="http://schemas.microsoft.com/office/drawing/2014/main" id="{F86B0785-ED7B-714F-BF61-9BF5D83879ED}"/>
+              </a:ext>
+            </a:extLst>
+          </p:cNvPr>
+          <p:cNvSpPr>
+            <a:spLocks noGrp="1"/>
+          </p:cNvSpPr>
+          <p:nvPr>
+            <p:ph idx="1"/>
+          </p:nvPr>
+        </p:nvSpPr>
+        <p:spPr/>
+        <p:txBody>
+          <a:bodyPr/>
+          <a:lstStyle/>
+          <a:p>
+            <a:r>
+              <a:rPr lang="en-US" dirty="0"/>
+              <a:t>The numerical representations are static, i.e., they are the same for all senses of a word:</a:t>
+            </a:r>
+          </a:p>
+          <a:p>
+            <a:pPr lvl="1"/>
+            <a:r>
+              <a:rPr lang="en-US" i="1" dirty="0"/>
+              <a:t>Bank</a:t>
+            </a:r>
+            <a:r>
+              <a:rPr lang="en-US" dirty="0"/>
+              <a:t> of the river</a:t>
+            </a:r>
+          </a:p>
+          <a:p>
+            <a:pPr lvl="1"/>
+            <a:r>
+              <a:rPr lang="en-US" i="1" dirty="0"/>
+              <a:t>Bank</a:t>
+            </a:r>
+            <a:r>
+              <a:rPr lang="en-US" dirty="0"/>
+              <a:t> of America</a:t>
+            </a:r>
+          </a:p>
+          <a:p>
+            <a:r>
+              <a:rPr lang="en-US" dirty="0"/>
+              <a:t>The numerical representations capture potential biases in the textual data:</a:t>
+            </a:r>
+          </a:p>
+          <a:p>
+            <a:pPr lvl="1"/>
+            <a:r>
+              <a:rPr lang="en-US" dirty="0"/>
+              <a:t>v(doctor) – v(man) = v(nurse) – v(woman)</a:t>
+            </a:r>
+          </a:p>
+          <a:p>
+            <a:endParaRPr lang="en-US" dirty="0"/>
+          </a:p>
+        </p:txBody>
+      </p:sp>
+      <p:sp>
+        <p:nvSpPr>
+          <p:cNvPr id="4" name="Slide Number Placeholder 3">
+            <a:extLst>
+              <a:ext uri="{FF2B5EF4-FFF2-40B4-BE49-F238E27FC236}">
+                <a16:creationId xmlns:a16="http://schemas.microsoft.com/office/drawing/2014/main" id="{EF26839F-DFF4-EA4A-8B53-5444C21B4DA2}"/>
+              </a:ext>
+            </a:extLst>
+          </p:cNvPr>
+          <p:cNvSpPr>
+            <a:spLocks noGrp="1"/>
+          </p:cNvSpPr>
+          <p:nvPr>
+            <p:ph type="sldNum" sz="quarter" idx="12"/>
+          </p:nvPr>
+        </p:nvSpPr>
+        <p:spPr/>
+        <p:txBody>
+          <a:bodyPr/>
+          <a:lstStyle/>
+          <a:p>
+            <a:fld id="{FF5157AA-4A4D-2C48-B0F6-C526C028AE97}" type="slidenum">
+              <a:rPr lang="en-US" smtClean="0"/>
+              <a:t>38</a:t>
+            </a:fld>
+            <a:endParaRPr lang="en-US"/>
+          </a:p>
+        </p:txBody>
+      </p:sp>
+    </p:spTree>
+    <p:extLst>
+      <p:ext uri="{BB962C8B-B14F-4D97-AF65-F5344CB8AC3E}">
+        <p14:creationId xmlns:p14="http://schemas.microsoft.com/office/powerpoint/2010/main" val="458590332"/>
+      </p:ext>
+    </p:extLst>
+  </p:cSld>
+  <p:clrMapOvr>
+    <a:masterClrMapping/>
+  </p:clrMapOvr>
+</p:sld>
+</file>
+
+<file path=ppt/slides/slide39.xml><?xml version="1.0" encoding="utf-8"?>
+<p:sld xmlns:a="http://schemas.openxmlformats.org/drawingml/2006/main" xmlns:r="http://schemas.openxmlformats.org/officeDocument/2006/relationships" xmlns:p="http://schemas.openxmlformats.org/presentationml/2006/main">
+  <p:cSld>
+    <p:spTree>
+      <p:nvGrpSpPr>
+        <p:cNvPr id="1" name=""/>
+        <p:cNvGrpSpPr/>
+        <p:nvPr/>
+      </p:nvGrpSpPr>
+      <p:grpSpPr>
+        <a:xfrm>
+          <a:off x="0" y="0"/>
+          <a:ext cx="0" cy="0"/>
+          <a:chOff x="0" y="0"/>
+          <a:chExt cx="0" cy="0"/>
+        </a:xfrm>
+      </p:grpSpPr>
+      <p:sp>
+        <p:nvSpPr>
           <p:cNvPr id="2" name="Title 1">
             <a:extLst>
               <a:ext uri="{FF2B5EF4-FFF2-40B4-BE49-F238E27FC236}">
@@ -14995,7 +15246,7 @@
           <a:p>
             <a:fld id="{FF5157AA-4A4D-2C48-B0F6-C526C028AE97}" type="slidenum">
               <a:rPr lang="en-US" smtClean="0"/>
-              <a:t>38</a:t>
+              <a:t>39</a:t>
             </a:fld>
             <a:endParaRPr lang="en-US"/>
           </a:p>

</xml_diff>